<commit_message>
adding new benchmark logic
</commit_message>
<xml_diff>
--- a/docs/diagrams/diagrams.pptx
+++ b/docs/diagrams/diagrams.pptx
@@ -264,7 +264,7 @@
           <a:p>
             <a:fld id="{B9DCAE00-9EC7-B94C-AB12-FE2BB94F5C60}" type="datetimeFigureOut">
               <a:rPr lang="en-BR" smtClean="0"/>
-              <a:t>08/05/23</a:t>
+              <a:t>15/06/23</a:t>
             </a:fld>
             <a:endParaRPr lang="en-BR"/>
           </a:p>
@@ -464,7 +464,7 @@
           <a:p>
             <a:fld id="{B9DCAE00-9EC7-B94C-AB12-FE2BB94F5C60}" type="datetimeFigureOut">
               <a:rPr lang="en-BR" smtClean="0"/>
-              <a:t>08/05/23</a:t>
+              <a:t>15/06/23</a:t>
             </a:fld>
             <a:endParaRPr lang="en-BR"/>
           </a:p>
@@ -674,7 +674,7 @@
           <a:p>
             <a:fld id="{B9DCAE00-9EC7-B94C-AB12-FE2BB94F5C60}" type="datetimeFigureOut">
               <a:rPr lang="en-BR" smtClean="0"/>
-              <a:t>08/05/23</a:t>
+              <a:t>15/06/23</a:t>
             </a:fld>
             <a:endParaRPr lang="en-BR"/>
           </a:p>
@@ -874,7 +874,7 @@
           <a:p>
             <a:fld id="{B9DCAE00-9EC7-B94C-AB12-FE2BB94F5C60}" type="datetimeFigureOut">
               <a:rPr lang="en-BR" smtClean="0"/>
-              <a:t>08/05/23</a:t>
+              <a:t>15/06/23</a:t>
             </a:fld>
             <a:endParaRPr lang="en-BR"/>
           </a:p>
@@ -1150,7 +1150,7 @@
           <a:p>
             <a:fld id="{B9DCAE00-9EC7-B94C-AB12-FE2BB94F5C60}" type="datetimeFigureOut">
               <a:rPr lang="en-BR" smtClean="0"/>
-              <a:t>08/05/23</a:t>
+              <a:t>15/06/23</a:t>
             </a:fld>
             <a:endParaRPr lang="en-BR"/>
           </a:p>
@@ -1418,7 +1418,7 @@
           <a:p>
             <a:fld id="{B9DCAE00-9EC7-B94C-AB12-FE2BB94F5C60}" type="datetimeFigureOut">
               <a:rPr lang="en-BR" smtClean="0"/>
-              <a:t>08/05/23</a:t>
+              <a:t>15/06/23</a:t>
             </a:fld>
             <a:endParaRPr lang="en-BR"/>
           </a:p>
@@ -1833,7 +1833,7 @@
           <a:p>
             <a:fld id="{B9DCAE00-9EC7-B94C-AB12-FE2BB94F5C60}" type="datetimeFigureOut">
               <a:rPr lang="en-BR" smtClean="0"/>
-              <a:t>08/05/23</a:t>
+              <a:t>15/06/23</a:t>
             </a:fld>
             <a:endParaRPr lang="en-BR"/>
           </a:p>
@@ -1975,7 +1975,7 @@
           <a:p>
             <a:fld id="{B9DCAE00-9EC7-B94C-AB12-FE2BB94F5C60}" type="datetimeFigureOut">
               <a:rPr lang="en-BR" smtClean="0"/>
-              <a:t>08/05/23</a:t>
+              <a:t>15/06/23</a:t>
             </a:fld>
             <a:endParaRPr lang="en-BR"/>
           </a:p>
@@ -2088,7 +2088,7 @@
           <a:p>
             <a:fld id="{B9DCAE00-9EC7-B94C-AB12-FE2BB94F5C60}" type="datetimeFigureOut">
               <a:rPr lang="en-BR" smtClean="0"/>
-              <a:t>08/05/23</a:t>
+              <a:t>15/06/23</a:t>
             </a:fld>
             <a:endParaRPr lang="en-BR"/>
           </a:p>
@@ -2401,7 +2401,7 @@
           <a:p>
             <a:fld id="{B9DCAE00-9EC7-B94C-AB12-FE2BB94F5C60}" type="datetimeFigureOut">
               <a:rPr lang="en-BR" smtClean="0"/>
-              <a:t>08/05/23</a:t>
+              <a:t>15/06/23</a:t>
             </a:fld>
             <a:endParaRPr lang="en-BR"/>
           </a:p>
@@ -2690,7 +2690,7 @@
           <a:p>
             <a:fld id="{B9DCAE00-9EC7-B94C-AB12-FE2BB94F5C60}" type="datetimeFigureOut">
               <a:rPr lang="en-BR" smtClean="0"/>
-              <a:t>08/05/23</a:t>
+              <a:t>15/06/23</a:t>
             </a:fld>
             <a:endParaRPr lang="en-BR"/>
           </a:p>
@@ -2933,7 +2933,7 @@
           <a:p>
             <a:fld id="{B9DCAE00-9EC7-B94C-AB12-FE2BB94F5C60}" type="datetimeFigureOut">
               <a:rPr lang="en-BR" smtClean="0"/>
-              <a:t>08/05/23</a:t>
+              <a:t>15/06/23</a:t>
             </a:fld>
             <a:endParaRPr lang="en-BR"/>
           </a:p>
@@ -3422,7 +3422,7 @@
         </p:nvSpPr>
         <p:spPr>
           <a:xfrm>
-            <a:off x="5545280" y="2092037"/>
+            <a:off x="5557155" y="1011383"/>
             <a:ext cx="1835727" cy="2172150"/>
           </a:xfrm>
           <a:prstGeom prst="rect">
@@ -3466,7 +3466,7 @@
         </p:nvSpPr>
         <p:spPr>
           <a:xfrm>
-            <a:off x="1499753" y="2124942"/>
+            <a:off x="1511628" y="1044288"/>
             <a:ext cx="3588328" cy="2130135"/>
           </a:xfrm>
           <a:prstGeom prst="rect">
@@ -3510,7 +3510,7 @@
         </p:nvSpPr>
         <p:spPr>
           <a:xfrm>
-            <a:off x="96982" y="2934904"/>
+            <a:off x="108857" y="1854250"/>
             <a:ext cx="1136072" cy="477982"/>
           </a:xfrm>
           <a:prstGeom prst="roundRect">
@@ -3557,7 +3557,7 @@
         </p:nvSpPr>
         <p:spPr>
           <a:xfrm>
-            <a:off x="3789220" y="2363933"/>
+            <a:off x="3801095" y="1283279"/>
             <a:ext cx="1104898" cy="477982"/>
           </a:xfrm>
           <a:prstGeom prst="roundRect">
@@ -3608,7 +3608,7 @@
         </p:nvCxnSpPr>
         <p:spPr>
           <a:xfrm flipV="1">
-            <a:off x="3382238" y="2602924"/>
+            <a:off x="3394113" y="1522270"/>
             <a:ext cx="406982" cy="570971"/>
           </a:xfrm>
           <a:prstGeom prst="straightConnector1">
@@ -3647,7 +3647,7 @@
         </p:nvSpPr>
         <p:spPr>
           <a:xfrm>
-            <a:off x="3799609" y="3558885"/>
+            <a:off x="3811484" y="2478231"/>
             <a:ext cx="1104899" cy="477982"/>
           </a:xfrm>
           <a:prstGeom prst="roundRect">
@@ -3698,7 +3698,7 @@
         </p:nvCxnSpPr>
         <p:spPr>
           <a:xfrm>
-            <a:off x="3382238" y="3173895"/>
+            <a:off x="3394113" y="2093241"/>
             <a:ext cx="417371" cy="623981"/>
           </a:xfrm>
           <a:prstGeom prst="straightConnector1">
@@ -3737,7 +3737,7 @@
         </p:nvSpPr>
         <p:spPr>
           <a:xfrm>
-            <a:off x="1499753" y="1478611"/>
+            <a:off x="1511628" y="397957"/>
             <a:ext cx="3588328" cy="646331"/>
           </a:xfrm>
           <a:prstGeom prst="rect">
@@ -3780,7 +3780,7 @@
         </p:nvSpPr>
         <p:spPr>
           <a:xfrm>
-            <a:off x="5697679" y="2271620"/>
+            <a:off x="5709554" y="1190966"/>
             <a:ext cx="1433946" cy="477982"/>
           </a:xfrm>
           <a:prstGeom prst="roundRect">
@@ -3831,7 +3831,7 @@
         </p:nvCxnSpPr>
         <p:spPr>
           <a:xfrm flipV="1">
-            <a:off x="5088081" y="3178112"/>
+            <a:off x="5099956" y="2097458"/>
             <a:ext cx="457199" cy="11898"/>
           </a:xfrm>
           <a:prstGeom prst="straightConnector1">
@@ -3870,7 +3870,7 @@
         </p:nvSpPr>
         <p:spPr>
           <a:xfrm>
-            <a:off x="7838206" y="2939121"/>
+            <a:off x="7850081" y="1858467"/>
             <a:ext cx="1011381" cy="477982"/>
           </a:xfrm>
           <a:prstGeom prst="roundRect">
@@ -3924,7 +3924,7 @@
         </p:nvSpPr>
         <p:spPr>
           <a:xfrm>
-            <a:off x="5697679" y="2961522"/>
+            <a:off x="5709554" y="1880868"/>
             <a:ext cx="1447801" cy="477982"/>
           </a:xfrm>
           <a:prstGeom prst="roundRect">
@@ -3971,7 +3971,7 @@
         </p:nvSpPr>
         <p:spPr>
           <a:xfrm>
-            <a:off x="5711533" y="3612571"/>
+            <a:off x="5723408" y="2531917"/>
             <a:ext cx="1447801" cy="477982"/>
           </a:xfrm>
           <a:prstGeom prst="roundRect">
@@ -4018,7 +4018,7 @@
         </p:nvSpPr>
         <p:spPr>
           <a:xfrm>
-            <a:off x="5545280" y="1719016"/>
+            <a:off x="5557155" y="638362"/>
             <a:ext cx="1835727" cy="369332"/>
           </a:xfrm>
           <a:prstGeom prst="rect">
@@ -4054,7 +4054,7 @@
         </p:nvSpPr>
         <p:spPr>
           <a:xfrm>
-            <a:off x="5545279" y="4557729"/>
+            <a:off x="5557154" y="3477075"/>
             <a:ext cx="1835728" cy="477982"/>
           </a:xfrm>
           <a:prstGeom prst="roundRect">
@@ -4105,7 +4105,7 @@
         </p:nvCxnSpPr>
         <p:spPr>
           <a:xfrm flipV="1">
-            <a:off x="6463143" y="4264187"/>
+            <a:off x="6475018" y="3183533"/>
             <a:ext cx="1" cy="293542"/>
           </a:xfrm>
           <a:prstGeom prst="straightConnector1">
@@ -4154,7 +4154,7 @@
         </p:nvCxnSpPr>
         <p:spPr>
           <a:xfrm>
-            <a:off x="7381007" y="3178112"/>
+            <a:off x="7392882" y="2097458"/>
             <a:ext cx="457199" cy="0"/>
           </a:xfrm>
           <a:prstGeom prst="straightConnector1">
@@ -4193,7 +4193,7 @@
         </p:nvSpPr>
         <p:spPr>
           <a:xfrm>
-            <a:off x="9675924" y="2363933"/>
+            <a:off x="9450781" y="1854250"/>
             <a:ext cx="1229591" cy="477982"/>
           </a:xfrm>
           <a:prstGeom prst="roundRect">
@@ -4244,8 +4244,8 @@
         </p:nvCxnSpPr>
         <p:spPr>
           <a:xfrm flipV="1">
-            <a:off x="8849587" y="2602924"/>
-            <a:ext cx="826337" cy="575188"/>
+            <a:off x="8861462" y="2093241"/>
+            <a:ext cx="589319" cy="4217"/>
           </a:xfrm>
           <a:prstGeom prst="straightConnector1">
             <a:avLst/>
@@ -4283,7 +4283,7 @@
         </p:nvSpPr>
         <p:spPr>
           <a:xfrm>
-            <a:off x="1814941" y="4557729"/>
+            <a:off x="1826816" y="3477075"/>
             <a:ext cx="1427017" cy="477982"/>
           </a:xfrm>
           <a:prstGeom prst="roundRect">
@@ -4334,7 +4334,7 @@
         </p:nvCxnSpPr>
         <p:spPr>
           <a:xfrm flipV="1">
-            <a:off x="2528450" y="3412886"/>
+            <a:off x="2540325" y="2332232"/>
             <a:ext cx="1" cy="1144843"/>
           </a:xfrm>
           <a:prstGeom prst="straightConnector1">
@@ -4379,7 +4379,7 @@
         </p:nvSpPr>
         <p:spPr>
           <a:xfrm>
-            <a:off x="1674663" y="2934904"/>
+            <a:off x="1686538" y="1854250"/>
             <a:ext cx="1707575" cy="477982"/>
           </a:xfrm>
           <a:prstGeom prst="roundRect">
@@ -4430,7 +4430,7 @@
         </p:nvCxnSpPr>
         <p:spPr>
           <a:xfrm>
-            <a:off x="1233054" y="3173895"/>
+            <a:off x="1244929" y="2093241"/>
             <a:ext cx="441609" cy="0"/>
           </a:xfrm>
           <a:prstGeom prst="straightConnector1">
@@ -4469,7 +4469,7 @@
         </p:nvSpPr>
         <p:spPr>
           <a:xfrm>
-            <a:off x="9675923" y="3413412"/>
+            <a:off x="10680372" y="4286778"/>
             <a:ext cx="1229592" cy="477982"/>
           </a:xfrm>
           <a:prstGeom prst="roundRect">
@@ -4497,7 +4497,7 @@
             <a:pPr algn="ctr"/>
             <a:r>
               <a:rPr lang="en-BR" dirty="0"/>
-              <a:t>Strategy Evaluation</a:t>
+              <a:t>Strategies’ Evaluation</a:t>
             </a:r>
           </a:p>
         </p:txBody>
@@ -4513,15 +4513,148 @@
           </p:cNvPr>
           <p:cNvCxnSpPr>
             <a:cxnSpLocks/>
-            <a:stCxn id="19" idx="3"/>
+            <a:stCxn id="33" idx="2"/>
             <a:endCxn id="25" idx="1"/>
           </p:cNvCxnSpPr>
           <p:nvPr/>
         </p:nvCxnSpPr>
         <p:spPr>
           <a:xfrm>
-            <a:off x="8849587" y="3178112"/>
-            <a:ext cx="826336" cy="474291"/>
+            <a:off x="10065577" y="2332232"/>
+            <a:ext cx="614795" cy="2193537"/>
+          </a:xfrm>
+          <a:prstGeom prst="straightConnector1">
+            <a:avLst/>
+          </a:prstGeom>
+          <a:ln>
+            <a:tailEnd type="triangle"/>
+          </a:ln>
+        </p:spPr>
+        <p:style>
+          <a:lnRef idx="1">
+            <a:schemeClr val="dk1"/>
+          </a:lnRef>
+          <a:fillRef idx="0">
+            <a:schemeClr val="dk1"/>
+          </a:fillRef>
+          <a:effectRef idx="0">
+            <a:schemeClr val="dk1"/>
+          </a:effectRef>
+          <a:fontRef idx="minor">
+            <a:schemeClr val="tx1"/>
+          </a:fontRef>
+        </p:style>
+      </p:cxnSp>
+      <p:sp>
+        <p:nvSpPr>
+          <p:cNvPr id="4" name="Rounded Rectangle 3">
+            <a:extLst>
+              <a:ext uri="{FF2B5EF4-FFF2-40B4-BE49-F238E27FC236}">
+                <a16:creationId xmlns:a16="http://schemas.microsoft.com/office/drawing/2014/main" id="{A66E36F8-D577-178E-D3CA-BA5F93D2E050}"/>
+              </a:ext>
+            </a:extLst>
+          </p:cNvPr>
+          <p:cNvSpPr/>
+          <p:nvPr/>
+        </p:nvSpPr>
+        <p:spPr>
+          <a:xfrm>
+            <a:off x="5874077" y="4993821"/>
+            <a:ext cx="1297132" cy="477982"/>
+          </a:xfrm>
+          <a:prstGeom prst="roundRect">
+            <a:avLst/>
+          </a:prstGeom>
+        </p:spPr>
+        <p:style>
+          <a:lnRef idx="1">
+            <a:schemeClr val="accent3"/>
+          </a:lnRef>
+          <a:fillRef idx="2">
+            <a:schemeClr val="accent3"/>
+          </a:fillRef>
+          <a:effectRef idx="1">
+            <a:schemeClr val="accent3"/>
+          </a:effectRef>
+          <a:fontRef idx="minor">
+            <a:schemeClr val="dk1"/>
+          </a:fontRef>
+        </p:style>
+        <p:txBody>
+          <a:bodyPr rtlCol="0" anchor="ctr"/>
+          <a:lstStyle/>
+          <a:p>
+            <a:pPr algn="ctr"/>
+            <a:r>
+              <a:rPr lang="en-BR" dirty="0"/>
+              <a:t>Benchmark</a:t>
+            </a:r>
+          </a:p>
+        </p:txBody>
+      </p:sp>
+      <p:cxnSp>
+        <p:nvCxnSpPr>
+          <p:cNvPr id="17" name="Straight Arrow Connector 16">
+            <a:extLst>
+              <a:ext uri="{FF2B5EF4-FFF2-40B4-BE49-F238E27FC236}">
+                <a16:creationId xmlns:a16="http://schemas.microsoft.com/office/drawing/2014/main" id="{547C41C1-CF3C-B7E6-2B20-0BE342D52F0C}"/>
+              </a:ext>
+            </a:extLst>
+          </p:cNvPr>
+          <p:cNvCxnSpPr>
+            <a:cxnSpLocks/>
+            <a:stCxn id="6" idx="2"/>
+            <a:endCxn id="4" idx="1"/>
+          </p:cNvCxnSpPr>
+          <p:nvPr/>
+        </p:nvCxnSpPr>
+        <p:spPr>
+          <a:xfrm>
+            <a:off x="4363934" y="2956213"/>
+            <a:ext cx="1510143" cy="2276599"/>
+          </a:xfrm>
+          <a:prstGeom prst="straightConnector1">
+            <a:avLst/>
+          </a:prstGeom>
+          <a:ln>
+            <a:tailEnd type="triangle"/>
+          </a:ln>
+        </p:spPr>
+        <p:style>
+          <a:lnRef idx="1">
+            <a:schemeClr val="dk1"/>
+          </a:lnRef>
+          <a:fillRef idx="0">
+            <a:schemeClr val="dk1"/>
+          </a:fillRef>
+          <a:effectRef idx="0">
+            <a:schemeClr val="dk1"/>
+          </a:effectRef>
+          <a:fontRef idx="minor">
+            <a:schemeClr val="tx1"/>
+          </a:fontRef>
+        </p:style>
+      </p:cxnSp>
+      <p:cxnSp>
+        <p:nvCxnSpPr>
+          <p:cNvPr id="27" name="Straight Arrow Connector 26">
+            <a:extLst>
+              <a:ext uri="{FF2B5EF4-FFF2-40B4-BE49-F238E27FC236}">
+                <a16:creationId xmlns:a16="http://schemas.microsoft.com/office/drawing/2014/main" id="{25AD495B-1587-DDC3-17B0-2A1C814F40AF}"/>
+              </a:ext>
+            </a:extLst>
+          </p:cNvPr>
+          <p:cNvCxnSpPr>
+            <a:cxnSpLocks/>
+            <a:stCxn id="4" idx="3"/>
+            <a:endCxn id="25" idx="1"/>
+          </p:cNvCxnSpPr>
+          <p:nvPr/>
+        </p:nvCxnSpPr>
+        <p:spPr>
+          <a:xfrm flipV="1">
+            <a:off x="7171209" y="4525769"/>
+            <a:ext cx="3509163" cy="707043"/>
           </a:xfrm>
           <a:prstGeom prst="straightConnector1">
             <a:avLst/>

</xml_diff>